<commit_message>
changed image for registration in presi
</commit_message>
<xml_diff>
--- a/presentation/Presentation.pptx
+++ b/presentation/Presentation.pptx
@@ -9422,7 +9422,7 @@
               <a:buNone/>
             </a:pPr>
             <a:r>
-              <a:rPr lang="en" dirty="0" smtClean="0"/>
+              <a:rPr lang="en" dirty="0"/>
               <a:t>MIALab Projekt – Group 2</a:t>
             </a:r>
             <a:endParaRPr dirty="0"/>
@@ -9464,7 +9464,7 @@
               <a:buNone/>
             </a:pPr>
             <a:r>
-              <a:rPr lang="en" dirty="0" smtClean="0"/>
+              <a:rPr lang="en" dirty="0"/>
               <a:t>Cyril Albrecht, Quentin Savary, Valerio Mollet</a:t>
             </a:r>
             <a:endParaRPr dirty="0"/>
@@ -17795,10 +17795,9 @@
           <a:lstStyle/>
           <a:p>
             <a:r>
-              <a:rPr lang="fr-CH" dirty="0" smtClean="0"/>
+              <a:rPr lang="fr-CH" dirty="0"/>
               <a:t>Questions</a:t>
             </a:r>
-            <a:endParaRPr lang="fr-CH" dirty="0"/>
           </a:p>
         </p:txBody>
       </p:sp>
@@ -17883,7 +17882,7 @@
               </a:spcAft>
             </a:pPr>
             <a:r>
-              <a:rPr lang="en-US" dirty="0" smtClean="0"/>
+              <a:rPr lang="en-US" dirty="0"/>
               <a:t>Hypothesis</a:t>
             </a:r>
           </a:p>
@@ -17894,10 +17893,9 @@
               </a:spcAft>
             </a:pPr>
             <a:r>
-              <a:rPr lang="en-US" dirty="0" smtClean="0"/>
+              <a:rPr lang="en-US" dirty="0"/>
               <a:t>Segmentation</a:t>
             </a:r>
-            <a:endParaRPr lang="en-US" dirty="0"/>
           </a:p>
           <a:p>
             <a:pPr>
@@ -17906,7 +17904,7 @@
               </a:spcAft>
             </a:pPr>
             <a:r>
-              <a:rPr lang="en-US" dirty="0" smtClean="0"/>
+              <a:rPr lang="en-US" dirty="0"/>
               <a:t>Registration</a:t>
             </a:r>
           </a:p>
@@ -17917,12 +17915,8 @@
               </a:spcAft>
             </a:pPr>
             <a:r>
-              <a:rPr lang="en-US" dirty="0" smtClean="0"/>
-              <a:t>Preliminary </a:t>
-            </a:r>
-            <a:r>
               <a:rPr lang="en-US" dirty="0"/>
-              <a:t>results</a:t>
+              <a:t>Preliminary results</a:t>
             </a:r>
           </a:p>
           <a:p>
@@ -17932,10 +17926,9 @@
               </a:spcAft>
             </a:pPr>
             <a:r>
-              <a:rPr lang="en-US" dirty="0" smtClean="0"/>
+              <a:rPr lang="en-US" dirty="0"/>
               <a:t>Current state</a:t>
             </a:r>
-            <a:endParaRPr lang="en-US" dirty="0"/>
           </a:p>
           <a:p>
             <a:pPr>
@@ -17944,7 +17937,7 @@
               </a:spcAft>
             </a:pPr>
             <a:r>
-              <a:rPr lang="en-US" dirty="0" smtClean="0"/>
+              <a:rPr lang="en-US" dirty="0"/>
               <a:t>Outlook</a:t>
             </a:r>
           </a:p>
@@ -17955,10 +17948,9 @@
               </a:spcAft>
             </a:pPr>
             <a:r>
-              <a:rPr lang="en-US" dirty="0" smtClean="0"/>
+              <a:rPr lang="en-US" dirty="0"/>
               <a:t>Questions</a:t>
             </a:r>
-            <a:endParaRPr lang="en-US" dirty="0"/>
           </a:p>
           <a:p>
             <a:pPr>
@@ -18043,16 +18035,8 @@
               </a:spcAft>
             </a:pPr>
             <a:r>
-              <a:rPr lang="en-US" dirty="0" smtClean="0"/>
-              <a:t>“Atlas </a:t>
-            </a:r>
-            <a:r>
               <a:rPr lang="en-US" dirty="0"/>
-              <a:t>based segmentation consists of a powerful baseline for brain tissue segmentation when compared to an ML based </a:t>
-            </a:r>
-            <a:r>
-              <a:rPr lang="en-US" dirty="0" smtClean="0"/>
-              <a:t>approach”</a:t>
+              <a:t>“Atlas based segmentation consists of a powerful baseline for brain tissue segmentation when compared to an ML based approach”</a:t>
             </a:r>
           </a:p>
           <a:p>
@@ -18062,7 +18046,7 @@
               </a:spcAft>
             </a:pPr>
             <a:r>
-              <a:rPr lang="en-US" dirty="0" smtClean="0"/>
+              <a:rPr lang="en-US" dirty="0"/>
               <a:t>Main focus on segmentation types</a:t>
             </a:r>
           </a:p>
@@ -18073,7 +18057,7 @@
               </a:spcAft>
             </a:pPr>
             <a:r>
-              <a:rPr lang="en-US" dirty="0" smtClean="0"/>
+              <a:rPr lang="en-US" dirty="0"/>
               <a:t>Segmentation depends on registration</a:t>
             </a:r>
           </a:p>
@@ -18098,7 +18082,7 @@
           <a:lstStyle/>
           <a:p>
             <a:r>
-              <a:rPr lang="fr-CH" dirty="0" err="1" smtClean="0"/>
+              <a:rPr lang="fr-CH" dirty="0" err="1"/>
               <a:t>Hypothesis</a:t>
             </a:r>
             <a:endParaRPr lang="fr-CH" dirty="0"/>
@@ -18307,7 +18291,7 @@
               <a:t> </a:t>
             </a:r>
             <a:r>
-              <a:rPr lang="fr-CH" dirty="0" err="1" smtClean="0"/>
+              <a:rPr lang="fr-CH" dirty="0" err="1"/>
               <a:t>averaging</a:t>
             </a:r>
             <a:endParaRPr lang="fr-CH" dirty="0"/>
@@ -18442,7 +18426,7 @@
               <a:t> </a:t>
             </a:r>
             <a:r>
-              <a:rPr lang="fr-CH" dirty="0" err="1" smtClean="0"/>
+              <a:rPr lang="fr-CH" dirty="0" err="1"/>
               <a:t>existed</a:t>
             </a:r>
             <a:endParaRPr lang="fr-CH" dirty="0"/>
@@ -18636,70 +18620,12 @@
           </a:p>
         </p:txBody>
       </p:sp>
-      <p:pic>
-        <p:nvPicPr>
-          <p:cNvPr id="9" name="Grafik 8">
-            <a:extLst>
-              <a:ext uri="{FF2B5EF4-FFF2-40B4-BE49-F238E27FC236}">
-                <a16:creationId xmlns="" xmlns:a16="http://schemas.microsoft.com/office/drawing/2014/main" id="{AF8B2320-66D0-48A1-94D9-CDA739EB6C6E}"/>
-              </a:ext>
-            </a:extLst>
-          </p:cNvPr>
-          <p:cNvPicPr>
-            <a:picLocks noChangeAspect="1"/>
-          </p:cNvPicPr>
-          <p:nvPr/>
-        </p:nvPicPr>
-        <p:blipFill rotWithShape="1">
-          <a:blip r:embed="rId2"/>
-          <a:srcRect l="27022" t="11890" r="24396" b="10729"/>
-          <a:stretch/>
-        </p:blipFill>
-        <p:spPr>
-          <a:xfrm>
-            <a:off x="5309668" y="1406177"/>
-            <a:ext cx="2843093" cy="3396343"/>
-          </a:xfrm>
-          <a:prstGeom prst="rect">
-            <a:avLst/>
-          </a:prstGeom>
-        </p:spPr>
-      </p:pic>
-      <p:pic>
-        <p:nvPicPr>
-          <p:cNvPr id="11" name="Grafik 10">
-            <a:extLst>
-              <a:ext uri="{FF2B5EF4-FFF2-40B4-BE49-F238E27FC236}">
-                <a16:creationId xmlns="" xmlns:a16="http://schemas.microsoft.com/office/drawing/2014/main" id="{5BAC95D5-9EC9-401A-8FF5-EE26E3A7DB7A}"/>
-              </a:ext>
-            </a:extLst>
-          </p:cNvPr>
-          <p:cNvPicPr>
-            <a:picLocks noChangeAspect="1"/>
-          </p:cNvPicPr>
-          <p:nvPr/>
-        </p:nvPicPr>
-        <p:blipFill rotWithShape="1">
-          <a:blip r:embed="rId3"/>
-          <a:srcRect l="27023" t="11367" r="24395" b="11251"/>
-          <a:stretch/>
-        </p:blipFill>
-        <p:spPr>
-          <a:xfrm>
-            <a:off x="672349" y="1406176"/>
-            <a:ext cx="2843093" cy="3396344"/>
-          </a:xfrm>
-          <a:prstGeom prst="rect">
-            <a:avLst/>
-          </a:prstGeom>
-        </p:spPr>
-      </p:pic>
       <p:sp>
         <p:nvSpPr>
           <p:cNvPr id="12" name="Textfeld 11">
             <a:extLst>
               <a:ext uri="{FF2B5EF4-FFF2-40B4-BE49-F238E27FC236}">
-                <a16:creationId xmlns="" xmlns:a16="http://schemas.microsoft.com/office/drawing/2014/main" id="{6FBAE4E7-3A3E-415A-8FC6-165BDB05ADF1}"/>
+                <a16:creationId xmlns:a16="http://schemas.microsoft.com/office/drawing/2014/main" id="{6FBAE4E7-3A3E-415A-8FC6-165BDB05ADF1}"/>
               </a:ext>
             </a:extLst>
           </p:cNvPr>
@@ -18770,7 +18696,7 @@
           <p:cNvPr id="14" name="Textfeld 13">
             <a:extLst>
               <a:ext uri="{FF2B5EF4-FFF2-40B4-BE49-F238E27FC236}">
-                <a16:creationId xmlns="" xmlns:a16="http://schemas.microsoft.com/office/drawing/2014/main" id="{672DD57D-91A9-4F21-9981-CDDB90B625C7}"/>
+                <a16:creationId xmlns:a16="http://schemas.microsoft.com/office/drawing/2014/main" id="{672DD57D-91A9-4F21-9981-CDDB90B625C7}"/>
               </a:ext>
             </a:extLst>
           </p:cNvPr>
@@ -18813,6 +18739,64 @@
           </a:p>
         </p:txBody>
       </p:sp>
+      <p:pic>
+        <p:nvPicPr>
+          <p:cNvPr id="4" name="Grafik 3">
+            <a:extLst>
+              <a:ext uri="{FF2B5EF4-FFF2-40B4-BE49-F238E27FC236}">
+                <a16:creationId xmlns:a16="http://schemas.microsoft.com/office/drawing/2014/main" id="{7E3AF0D3-7CCB-49C7-8201-E4D490CA2181}"/>
+              </a:ext>
+            </a:extLst>
+          </p:cNvPr>
+          <p:cNvPicPr>
+            <a:picLocks noChangeAspect="1"/>
+          </p:cNvPicPr>
+          <p:nvPr/>
+        </p:nvPicPr>
+        <p:blipFill rotWithShape="1">
+          <a:blip r:embed="rId2"/>
+          <a:srcRect l="27259" t="12941" r="24160" b="11014"/>
+          <a:stretch/>
+        </p:blipFill>
+        <p:spPr>
+          <a:xfrm>
+            <a:off x="5409557" y="1487827"/>
+            <a:ext cx="2843095" cy="3337752"/>
+          </a:xfrm>
+          <a:prstGeom prst="rect">
+            <a:avLst/>
+          </a:prstGeom>
+        </p:spPr>
+      </p:pic>
+      <p:pic>
+        <p:nvPicPr>
+          <p:cNvPr id="6" name="Grafik 5">
+            <a:extLst>
+              <a:ext uri="{FF2B5EF4-FFF2-40B4-BE49-F238E27FC236}">
+                <a16:creationId xmlns:a16="http://schemas.microsoft.com/office/drawing/2014/main" id="{ADE48117-B4F3-4EC6-BD89-D1CD35CC7B8F}"/>
+              </a:ext>
+            </a:extLst>
+          </p:cNvPr>
+          <p:cNvPicPr>
+            <a:picLocks noChangeAspect="1"/>
+          </p:cNvPicPr>
+          <p:nvPr/>
+        </p:nvPicPr>
+        <p:blipFill rotWithShape="1">
+          <a:blip r:embed="rId3"/>
+          <a:srcRect l="27042" t="12259" r="24376" b="11695"/>
+          <a:stretch/>
+        </p:blipFill>
+        <p:spPr>
+          <a:xfrm>
+            <a:off x="672348" y="1487827"/>
+            <a:ext cx="2843094" cy="3337752"/>
+          </a:xfrm>
+          <a:prstGeom prst="rect">
+            <a:avLst/>
+          </a:prstGeom>
+        </p:spPr>
+      </p:pic>
     </p:spTree>
     <p:extLst>
       <p:ext uri="{BB962C8B-B14F-4D97-AF65-F5344CB8AC3E}">
@@ -18918,7 +18902,7 @@
               <a:t> </a:t>
             </a:r>
             <a:r>
-              <a:rPr lang="fr-CH" dirty="0" err="1" smtClean="0"/>
+              <a:rPr lang="fr-CH" dirty="0" err="1"/>
               <a:t>results</a:t>
             </a:r>
             <a:endParaRPr lang="fr-CH" dirty="0"/>
@@ -18988,13 +18972,8 @@
             </a:pPr>
             <a:r>
               <a:rPr lang="en-US" dirty="0"/>
-              <a:t>Implementation of majority voting atlas-based </a:t>
+              <a:t>Implementation of majority voting atlas-based segmentation</a:t>
             </a:r>
-            <a:r>
-              <a:rPr lang="en-US" dirty="0" smtClean="0"/>
-              <a:t>segmentation</a:t>
-            </a:r>
-            <a:endParaRPr lang="en-US" dirty="0"/>
           </a:p>
           <a:p>
             <a:pPr>
@@ -19004,15 +18983,7 @@
             </a:pPr>
             <a:r>
               <a:rPr lang="en-US" dirty="0"/>
-              <a:t>Comparison of the four </a:t>
-            </a:r>
-            <a:r>
-              <a:rPr lang="en-US" dirty="0" smtClean="0"/>
-              <a:t>different </a:t>
-            </a:r>
-            <a:r>
-              <a:rPr lang="en-US" dirty="0"/>
-              <a:t>solution</a:t>
+              <a:t>Comparison of the four different solution</a:t>
             </a:r>
           </a:p>
           <a:p>
@@ -19077,7 +19048,7 @@
                 <a:spcPts val="600"/>
               </a:spcAft>
             </a:pPr>
-            <a:endParaRPr lang="fr-CH" dirty="0" smtClean="0"/>
+            <a:endParaRPr lang="fr-CH" dirty="0"/>
           </a:p>
         </p:txBody>
       </p:sp>
@@ -19104,7 +19075,6 @@
               <a:rPr lang="fr-CH" dirty="0"/>
               <a:t> state</a:t>
             </a:r>
-            <a:endParaRPr lang="fr-CH" dirty="0"/>
           </a:p>
         </p:txBody>
       </p:sp>
@@ -19159,15 +19129,15 @@
               </a:spcAft>
             </a:pPr>
             <a:r>
-              <a:rPr lang="en-GB" dirty="0" smtClean="0"/>
+              <a:rPr lang="en-GB" dirty="0"/>
               <a:t>More </a:t>
             </a:r>
             <a:r>
-              <a:rPr lang="en-GB" dirty="0" err="1" smtClean="0"/>
+              <a:rPr lang="en-GB" dirty="0" err="1"/>
               <a:t>altas</a:t>
             </a:r>
             <a:r>
-              <a:rPr lang="en-GB" dirty="0" smtClean="0"/>
+              <a:rPr lang="en-GB" dirty="0"/>
               <a:t> building techniques</a:t>
             </a:r>
           </a:p>
@@ -19178,12 +19148,8 @@
               </a:spcAft>
             </a:pPr>
             <a:r>
-              <a:rPr lang="en-GB" dirty="0" smtClean="0"/>
-              <a:t>More ML segmentation </a:t>
-            </a:r>
-            <a:r>
-              <a:rPr lang="en-GB" dirty="0" smtClean="0"/>
-              <a:t>types</a:t>
+              <a:rPr lang="en-GB" dirty="0"/>
+              <a:t>More ML segmentation types</a:t>
             </a:r>
           </a:p>
           <a:p>
@@ -19193,14 +19159,13 @@
               </a:spcAft>
             </a:pPr>
             <a:r>
-              <a:rPr lang="en-GB" dirty="0" err="1" smtClean="0"/>
+              <a:rPr lang="en-GB" dirty="0" err="1"/>
               <a:t>Uniformize</a:t>
             </a:r>
             <a:r>
-              <a:rPr lang="en-GB" dirty="0" smtClean="0"/>
+              <a:rPr lang="en-GB" dirty="0"/>
               <a:t> result plot</a:t>
             </a:r>
-            <a:endParaRPr lang="en-GB" dirty="0" smtClean="0"/>
           </a:p>
           <a:p>
             <a:pPr>
@@ -19209,7 +19174,7 @@
               </a:spcAft>
             </a:pPr>
             <a:r>
-              <a:rPr lang="en-GB" dirty="0" smtClean="0"/>
+              <a:rPr lang="en-GB" dirty="0"/>
               <a:t>Eventually hybrid solution</a:t>
             </a:r>
           </a:p>
@@ -19223,7 +19188,7 @@
               </a:spcAft>
             </a:pPr>
             <a:r>
-              <a:rPr lang="en-GB" dirty="0" smtClean="0"/>
+              <a:rPr lang="en-GB" dirty="0"/>
               <a:t>ML for grey and white matter</a:t>
             </a:r>
           </a:p>
@@ -19237,10 +19202,9 @@
               </a:spcAft>
             </a:pPr>
             <a:r>
-              <a:rPr lang="en-GB" dirty="0" smtClean="0"/>
+              <a:rPr lang="en-GB" dirty="0"/>
               <a:t>Atlas for amygdala, hippocampus and thalamus</a:t>
             </a:r>
-            <a:endParaRPr lang="en-GB" dirty="0"/>
           </a:p>
         </p:txBody>
       </p:sp>
@@ -19260,10 +19224,9 @@
           <a:lstStyle/>
           <a:p>
             <a:r>
-              <a:rPr lang="fr-CH" dirty="0" smtClean="0"/>
+              <a:rPr lang="fr-CH" dirty="0"/>
               <a:t>Outlook</a:t>
             </a:r>
-            <a:endParaRPr lang="fr-CH" dirty="0"/>
           </a:p>
         </p:txBody>
       </p:sp>

</xml_diff>

<commit_message>
updated outlook and results for final presentation
</commit_message>
<xml_diff>
--- a/presentation/Presentation.pptx
+++ b/presentation/Presentation.pptx
@@ -5,7 +5,7 @@
     <p:sldMasterId id="2147483672" r:id="rId1"/>
   </p:sldMasterIdLst>
   <p:notesMasterIdLst>
-    <p:notesMasterId r:id="rId12"/>
+    <p:notesMasterId r:id="rId13"/>
   </p:notesMasterIdLst>
   <p:sldIdLst>
     <p:sldId id="256" r:id="rId2"/>
@@ -14,25 +14,26 @@
     <p:sldId id="315" r:id="rId5"/>
     <p:sldId id="313" r:id="rId6"/>
     <p:sldId id="314" r:id="rId7"/>
-    <p:sldId id="309" r:id="rId8"/>
-    <p:sldId id="307" r:id="rId9"/>
-    <p:sldId id="310" r:id="rId10"/>
-    <p:sldId id="311" r:id="rId11"/>
+    <p:sldId id="316" r:id="rId8"/>
+    <p:sldId id="319" r:id="rId9"/>
+    <p:sldId id="320" r:id="rId10"/>
+    <p:sldId id="310" r:id="rId11"/>
+    <p:sldId id="311" r:id="rId12"/>
   </p:sldIdLst>
   <p:sldSz cx="9144000" cy="5143500" type="screen16x9"/>
   <p:notesSz cx="6858000" cy="9144000"/>
   <p:embeddedFontLst>
     <p:embeddedFont>
-      <p:font typeface="Fira Sans Condensed" panose="020B0604020202020204" charset="0"/>
-      <p:regular r:id="rId13"/>
+      <p:font typeface="Fira Sans Condensed ExtraBold" panose="020B0604020202020204" charset="0"/>
       <p:bold r:id="rId14"/>
-      <p:italic r:id="rId15"/>
-      <p:boldItalic r:id="rId16"/>
+      <p:boldItalic r:id="rId15"/>
     </p:embeddedFont>
     <p:embeddedFont>
-      <p:font typeface="Fira Sans Condensed ExtraBold" panose="020B0604020202020204" charset="0"/>
+      <p:font typeface="Fira Sans Condensed" panose="020B0604020202020204" charset="0"/>
+      <p:regular r:id="rId16"/>
       <p:bold r:id="rId17"/>
-      <p:boldItalic r:id="rId18"/>
+      <p:italic r:id="rId18"/>
+      <p:boldItalic r:id="rId19"/>
     </p:embeddedFont>
   </p:embeddedFontLst>
   <p:defaultTextStyle>
@@ -17796,6 +17797,108 @@
       </p:grpSpPr>
       <p:sp>
         <p:nvSpPr>
+          <p:cNvPr id="2" name="Espace réservé du texte 1"/>
+          <p:cNvSpPr>
+            <a:spLocks noGrp="1"/>
+          </p:cNvSpPr>
+          <p:nvPr>
+            <p:ph type="body" idx="1"/>
+          </p:nvPr>
+        </p:nvSpPr>
+        <p:spPr/>
+        <p:txBody>
+          <a:bodyPr/>
+          <a:lstStyle/>
+          <a:p>
+            <a:pPr>
+              <a:spcAft>
+                <a:spcPts val="600"/>
+              </a:spcAft>
+            </a:pPr>
+            <a:r>
+              <a:rPr lang="en-GB" dirty="0"/>
+              <a:t>Final report redaction</a:t>
+            </a:r>
+          </a:p>
+          <a:p>
+            <a:pPr>
+              <a:spcAft>
+                <a:spcPts val="600"/>
+              </a:spcAft>
+            </a:pPr>
+            <a:r>
+              <a:rPr lang="en-GB" dirty="0"/>
+              <a:t>Clean source </a:t>
+            </a:r>
+            <a:r>
+              <a:rPr lang="en-GB" dirty="0" smtClean="0"/>
+              <a:t>code</a:t>
+            </a:r>
+            <a:endParaRPr lang="en-GB" dirty="0"/>
+          </a:p>
+        </p:txBody>
+      </p:sp>
+      <p:sp>
+        <p:nvSpPr>
+          <p:cNvPr id="3" name="Titre 2"/>
+          <p:cNvSpPr>
+            <a:spLocks noGrp="1"/>
+          </p:cNvSpPr>
+          <p:nvPr>
+            <p:ph type="title"/>
+          </p:nvPr>
+        </p:nvSpPr>
+        <p:spPr/>
+        <p:txBody>
+          <a:bodyPr/>
+          <a:lstStyle/>
+          <a:p>
+            <a:r>
+              <a:rPr lang="fr-CH" dirty="0"/>
+              <a:t>Outlook</a:t>
+            </a:r>
+          </a:p>
+        </p:txBody>
+      </p:sp>
+    </p:spTree>
+    <p:extLst>
+      <p:ext uri="{BB962C8B-B14F-4D97-AF65-F5344CB8AC3E}">
+        <p14:creationId xmlns:p14="http://schemas.microsoft.com/office/powerpoint/2010/main" val="3395289792"/>
+      </p:ext>
+    </p:extLst>
+  </p:cSld>
+  <p:clrMapOvr>
+    <a:masterClrMapping/>
+  </p:clrMapOvr>
+  <p:timing>
+    <p:tnLst>
+      <p:par>
+        <p:cTn id="1" dur="indefinite" restart="never" nodeType="tmRoot"/>
+      </p:par>
+    </p:tnLst>
+  </p:timing>
+</p:sld>
+</file>
+
+<file path=ppt/slides/slide11.xml><?xml version="1.0" encoding="utf-8"?>
+<p:sld xmlns:a="http://schemas.openxmlformats.org/drawingml/2006/main" xmlns:r="http://schemas.openxmlformats.org/officeDocument/2006/relationships" xmlns:p="http://schemas.openxmlformats.org/presentationml/2006/main">
+  <p:cSld>
+    <p:spTree>
+      <p:nvGrpSpPr>
+        <p:cNvPr id="1" name=""/>
+        <p:cNvGrpSpPr/>
+        <p:nvPr/>
+      </p:nvGrpSpPr>
+      <p:grpSpPr>
+        <a:xfrm>
+          <a:off x="0" y="0"/>
+          <a:ext cx="0" cy="0"/>
+          <a:chOff x="0" y="0"/>
+          <a:chExt cx="0" cy="0"/>
+        </a:xfrm>
+      </p:grpSpPr>
+      <p:sp>
+        <p:nvSpPr>
           <p:cNvPr id="3" name="Titre 2"/>
           <p:cNvSpPr>
             <a:spLocks noGrp="1"/>
@@ -17938,7 +18041,11 @@
             </a:pPr>
             <a:r>
               <a:rPr lang="en-US" dirty="0"/>
-              <a:t>Preliminary results</a:t>
+              <a:t>R</a:t>
+            </a:r>
+            <a:r>
+              <a:rPr lang="en-US" dirty="0" smtClean="0"/>
+              <a:t>esults</a:t>
             </a:r>
           </a:p>
           <a:p>
@@ -17948,20 +18055,10 @@
               </a:spcAft>
             </a:pPr>
             <a:r>
-              <a:rPr lang="en-US" dirty="0"/>
-              <a:t>Current state</a:t>
-            </a:r>
-          </a:p>
-          <a:p>
-            <a:pPr>
-              <a:spcAft>
-                <a:spcPts val="600"/>
-              </a:spcAft>
-            </a:pPr>
-            <a:r>
-              <a:rPr lang="en-US" dirty="0"/>
+              <a:rPr lang="en-US" dirty="0" smtClean="0"/>
               <a:t>Outlook</a:t>
             </a:r>
+            <a:endParaRPr lang="en-US" dirty="0"/>
           </a:p>
           <a:p>
             <a:pPr>
@@ -18575,7 +18672,7 @@
           <p:cNvPr id="12" name="Textfeld 11">
             <a:extLst>
               <a:ext uri="{FF2B5EF4-FFF2-40B4-BE49-F238E27FC236}">
-                <a16:creationId xmlns:a16="http://schemas.microsoft.com/office/drawing/2014/main" xmlns="" id="{6FBAE4E7-3A3E-415A-8FC6-165BDB05ADF1}"/>
+                <a16:creationId xmlns="" xmlns:a16="http://schemas.microsoft.com/office/drawing/2014/main" id="{6FBAE4E7-3A3E-415A-8FC6-165BDB05ADF1}"/>
               </a:ext>
             </a:extLst>
           </p:cNvPr>
@@ -18646,7 +18743,7 @@
           <p:cNvPr id="14" name="Textfeld 13">
             <a:extLst>
               <a:ext uri="{FF2B5EF4-FFF2-40B4-BE49-F238E27FC236}">
-                <a16:creationId xmlns:a16="http://schemas.microsoft.com/office/drawing/2014/main" xmlns="" id="{672DD57D-91A9-4F21-9981-CDDB90B625C7}"/>
+                <a16:creationId xmlns="" xmlns:a16="http://schemas.microsoft.com/office/drawing/2014/main" id="{672DD57D-91A9-4F21-9981-CDDB90B625C7}"/>
               </a:ext>
             </a:extLst>
           </p:cNvPr>
@@ -18694,7 +18791,7 @@
           <p:cNvPr id="4" name="Grafik 3">
             <a:extLst>
               <a:ext uri="{FF2B5EF4-FFF2-40B4-BE49-F238E27FC236}">
-                <a16:creationId xmlns:a16="http://schemas.microsoft.com/office/drawing/2014/main" xmlns="" id="{7E3AF0D3-7CCB-49C7-8201-E4D490CA2181}"/>
+                <a16:creationId xmlns="" xmlns:a16="http://schemas.microsoft.com/office/drawing/2014/main" id="{7E3AF0D3-7CCB-49C7-8201-E4D490CA2181}"/>
               </a:ext>
             </a:extLst>
           </p:cNvPr>
@@ -18723,7 +18820,7 @@
           <p:cNvPr id="6" name="Grafik 5">
             <a:extLst>
               <a:ext uri="{FF2B5EF4-FFF2-40B4-BE49-F238E27FC236}">
-                <a16:creationId xmlns:a16="http://schemas.microsoft.com/office/drawing/2014/main" xmlns="" id="{ADE48117-B4F3-4EC6-BD89-D1CD35CC7B8F}"/>
+                <a16:creationId xmlns="" xmlns:a16="http://schemas.microsoft.com/office/drawing/2014/main" id="{ADE48117-B4F3-4EC6-BD89-D1CD35CC7B8F}"/>
               </a:ext>
             </a:extLst>
           </p:cNvPr>
@@ -18786,57 +18883,6 @@
       </p:grpSpPr>
       <p:sp>
         <p:nvSpPr>
-          <p:cNvPr id="2" name="Espace réservé du texte 1"/>
-          <p:cNvSpPr>
-            <a:spLocks noGrp="1"/>
-          </p:cNvSpPr>
-          <p:nvPr>
-            <p:ph type="body" idx="1"/>
-          </p:nvPr>
-        </p:nvSpPr>
-        <p:spPr/>
-        <p:txBody>
-          <a:bodyPr/>
-          <a:lstStyle/>
-          <a:p>
-            <a:endParaRPr lang="fr-CH" dirty="0"/>
-          </a:p>
-        </p:txBody>
-      </p:sp>
-      <p:pic>
-        <p:nvPicPr>
-          <p:cNvPr id="4" name="Image 3"/>
-          <p:cNvPicPr>
-            <a:picLocks noChangeAspect="1"/>
-          </p:cNvPicPr>
-          <p:nvPr/>
-        </p:nvPicPr>
-        <p:blipFill rotWithShape="1">
-          <a:blip r:embed="rId2">
-            <a:extLst>
-              <a:ext uri="{28A0092B-C50C-407E-A947-70E740481C1C}">
-                <a14:useLocalDpi xmlns:a14="http://schemas.microsoft.com/office/drawing/2010/main" val="0"/>
-              </a:ext>
-            </a:extLst>
-          </a:blip>
-          <a:srcRect l="7545" t="8628" r="8766" b="3934"/>
-          <a:stretch/>
-        </p:blipFill>
-        <p:spPr>
-          <a:xfrm>
-            <a:off x="672349" y="1014977"/>
-            <a:ext cx="6322339" cy="4128524"/>
-          </a:xfrm>
-          <a:prstGeom prst="rect">
-            <a:avLst/>
-          </a:prstGeom>
-          <a:effectLst>
-            <a:softEdge rad="31750"/>
-          </a:effectLst>
-        </p:spPr>
-      </p:pic>
-      <p:sp>
-        <p:nvSpPr>
           <p:cNvPr id="3" name="Titre 2"/>
           <p:cNvSpPr>
             <a:spLocks noGrp="1"/>
@@ -18851,25 +18897,137 @@
           <a:lstStyle/>
           <a:p>
             <a:r>
-              <a:rPr lang="fr-CH" dirty="0" err="1"/>
-              <a:t>Preliminary</a:t>
+              <a:rPr lang="fr-CH" dirty="0" err="1" smtClean="0"/>
+              <a:t>Results</a:t>
             </a:r>
             <a:r>
-              <a:rPr lang="fr-CH" dirty="0"/>
+              <a:rPr lang="fr-CH" dirty="0" smtClean="0"/>
+              <a:t> – Non-</a:t>
+            </a:r>
+            <a:r>
+              <a:rPr lang="fr-CH" dirty="0" err="1" smtClean="0"/>
+              <a:t>rigid</a:t>
+            </a:r>
+            <a:r>
+              <a:rPr lang="fr-CH" dirty="0" smtClean="0"/>
+              <a:t> vs affine</a:t>
+            </a:r>
+            <a:endParaRPr lang="fr-CH" dirty="0"/>
+          </a:p>
+        </p:txBody>
+      </p:sp>
+      <p:pic>
+        <p:nvPicPr>
+          <p:cNvPr id="5" name="Image 4"/>
+          <p:cNvPicPr>
+            <a:picLocks noChangeAspect="1"/>
+          </p:cNvPicPr>
+          <p:nvPr/>
+        </p:nvPicPr>
+        <p:blipFill>
+          <a:blip r:embed="rId2">
+            <a:extLst>
+              <a:ext uri="{28A0092B-C50C-407E-A947-70E740481C1C}">
+                <a14:useLocalDpi xmlns:a14="http://schemas.microsoft.com/office/drawing/2010/main" val="0"/>
+              </a:ext>
+            </a:extLst>
+          </a:blip>
+          <a:stretch>
+            <a:fillRect/>
+          </a:stretch>
+        </p:blipFill>
+        <p:spPr>
+          <a:xfrm>
+            <a:off x="672350" y="1009150"/>
+            <a:ext cx="6440174" cy="4025108"/>
+          </a:xfrm>
+          <a:prstGeom prst="rect">
+            <a:avLst/>
+          </a:prstGeom>
+        </p:spPr>
+      </p:pic>
+      <p:sp>
+        <p:nvSpPr>
+          <p:cNvPr id="4" name="ZoneTexte 3"/>
+          <p:cNvSpPr txBox="1"/>
+          <p:nvPr/>
+        </p:nvSpPr>
+        <p:spPr>
+          <a:xfrm>
+            <a:off x="6748798" y="3808428"/>
+            <a:ext cx="1170513" cy="707886"/>
+          </a:xfrm>
+          <a:prstGeom prst="rect">
+            <a:avLst/>
+          </a:prstGeom>
+          <a:noFill/>
+        </p:spPr>
+        <p:txBody>
+          <a:bodyPr wrap="none" rtlCol="0">
+            <a:spAutoFit/>
+          </a:bodyPr>
+          <a:lstStyle/>
+          <a:p>
+            <a:endParaRPr lang="fr-CH" sz="800" dirty="0" smtClean="0"/>
+          </a:p>
+          <a:p>
+            <a:r>
+              <a:rPr lang="fr-CH" sz="800" dirty="0" smtClean="0"/>
+              <a:t>MV: </a:t>
+            </a:r>
+            <a:r>
+              <a:rPr lang="fr-CH" sz="800" dirty="0" err="1" smtClean="0"/>
+              <a:t>majority</a:t>
+            </a:r>
+            <a:r>
+              <a:rPr lang="fr-CH" sz="800" dirty="0" smtClean="0"/>
               <a:t> </a:t>
             </a:r>
             <a:r>
-              <a:rPr lang="fr-CH" dirty="0" err="1"/>
-              <a:t>results</a:t>
+              <a:rPr lang="fr-CH" sz="800" dirty="0" err="1" smtClean="0"/>
+              <a:t>voting</a:t>
             </a:r>
-            <a:endParaRPr lang="fr-CH" dirty="0"/>
+            <a:endParaRPr lang="fr-CH" sz="800" dirty="0" smtClean="0"/>
+          </a:p>
+          <a:p>
+            <a:r>
+              <a:rPr lang="fr-CH" sz="800" dirty="0" smtClean="0"/>
+              <a:t>ML: machine </a:t>
+            </a:r>
+            <a:r>
+              <a:rPr lang="fr-CH" sz="800" dirty="0" err="1" smtClean="0"/>
+              <a:t>learning</a:t>
+            </a:r>
+            <a:endParaRPr lang="fr-CH" sz="800" dirty="0" smtClean="0"/>
+          </a:p>
+          <a:p>
+            <a:r>
+              <a:rPr lang="fr-CH" sz="800" dirty="0" smtClean="0"/>
+              <a:t>NR: non-</a:t>
+            </a:r>
+            <a:r>
+              <a:rPr lang="fr-CH" sz="800" dirty="0" err="1" smtClean="0"/>
+              <a:t>rigid</a:t>
+            </a:r>
+            <a:endParaRPr lang="fr-CH" sz="800" dirty="0" smtClean="0"/>
+          </a:p>
+          <a:p>
+            <a:r>
+              <a:rPr lang="fr-CH" sz="800" dirty="0" err="1" smtClean="0"/>
+              <a:t>Aff</a:t>
+            </a:r>
+            <a:r>
+              <a:rPr lang="fr-CH" sz="800" dirty="0" smtClean="0"/>
+              <a:t>: affine</a:t>
+            </a:r>
+            <a:endParaRPr lang="fr-CH" sz="800" dirty="0"/>
           </a:p>
         </p:txBody>
       </p:sp>
     </p:spTree>
     <p:extLst>
       <p:ext uri="{BB962C8B-B14F-4D97-AF65-F5344CB8AC3E}">
-        <p14:creationId xmlns:p14="http://schemas.microsoft.com/office/powerpoint/2010/main" val="10031678"/>
+        <p14:creationId xmlns:p14="http://schemas.microsoft.com/office/powerpoint/2010/main" val="1353153529"/>
       </p:ext>
     </p:extLst>
   </p:cSld>
@@ -18905,119 +19063,6 @@
       </p:grpSpPr>
       <p:sp>
         <p:nvSpPr>
-          <p:cNvPr id="2" name="Espace réservé du texte 1"/>
-          <p:cNvSpPr>
-            <a:spLocks noGrp="1"/>
-          </p:cNvSpPr>
-          <p:nvPr>
-            <p:ph type="body" idx="1"/>
-          </p:nvPr>
-        </p:nvSpPr>
-        <p:spPr/>
-        <p:txBody>
-          <a:bodyPr/>
-          <a:lstStyle/>
-          <a:p>
-            <a:pPr>
-              <a:spcAft>
-                <a:spcPts val="600"/>
-              </a:spcAft>
-            </a:pPr>
-            <a:r>
-              <a:rPr lang="en-US" dirty="0"/>
-              <a:t>Implementation of non-rigid registration</a:t>
-            </a:r>
-          </a:p>
-          <a:p>
-            <a:pPr>
-              <a:spcAft>
-                <a:spcPts val="600"/>
-              </a:spcAft>
-            </a:pPr>
-            <a:r>
-              <a:rPr lang="en-US" dirty="0"/>
-              <a:t>Implementation of majority voting atlas-based segmentation</a:t>
-            </a:r>
-          </a:p>
-          <a:p>
-            <a:pPr>
-              <a:spcAft>
-                <a:spcPts val="600"/>
-              </a:spcAft>
-            </a:pPr>
-            <a:r>
-              <a:rPr lang="en-US" dirty="0"/>
-              <a:t>Comparison of the four different solution</a:t>
-            </a:r>
-          </a:p>
-          <a:p>
-            <a:pPr lvl="1">
-              <a:spcBef>
-                <a:spcPts val="0"/>
-              </a:spcBef>
-              <a:spcAft>
-                <a:spcPts val="600"/>
-              </a:spcAft>
-            </a:pPr>
-            <a:r>
-              <a:rPr lang="en-US" dirty="0"/>
-              <a:t>ML-based segmentation with affine registration</a:t>
-            </a:r>
-          </a:p>
-          <a:p>
-            <a:pPr lvl="1">
-              <a:spcBef>
-                <a:spcPts val="0"/>
-              </a:spcBef>
-              <a:spcAft>
-                <a:spcPts val="600"/>
-              </a:spcAft>
-            </a:pPr>
-            <a:r>
-              <a:rPr lang="en-US" dirty="0"/>
-              <a:t>ML-based segmentation with non-rigid registration</a:t>
-            </a:r>
-          </a:p>
-          <a:p>
-            <a:pPr lvl="1">
-              <a:spcBef>
-                <a:spcPts val="0"/>
-              </a:spcBef>
-              <a:spcAft>
-                <a:spcPts val="600"/>
-              </a:spcAft>
-            </a:pPr>
-            <a:r>
-              <a:rPr lang="en-US" dirty="0"/>
-              <a:t>Atlas-based segmentation with affine registration</a:t>
-            </a:r>
-          </a:p>
-          <a:p>
-            <a:pPr lvl="1">
-              <a:spcBef>
-                <a:spcPts val="0"/>
-              </a:spcBef>
-              <a:spcAft>
-                <a:spcPts val="600"/>
-              </a:spcAft>
-            </a:pPr>
-            <a:r>
-              <a:rPr lang="en-US" dirty="0"/>
-              <a:t>Atlas-based segmentation with non-rigid registration</a:t>
-            </a:r>
-          </a:p>
-          <a:p>
-            <a:pPr>
-              <a:spcAft>
-                <a:spcPts val="600"/>
-              </a:spcAft>
-            </a:pPr>
-            <a:endParaRPr lang="fr-CH" dirty="0"/>
-          </a:p>
-        </p:txBody>
-      </p:sp>
-      <p:sp>
-        <p:nvSpPr>
           <p:cNvPr id="3" name="Titre 2"/>
           <p:cNvSpPr>
             <a:spLocks noGrp="1"/>
@@ -19032,20 +19077,153 @@
           <a:lstStyle/>
           <a:p>
             <a:r>
-              <a:rPr lang="fr-CH" dirty="0" err="1"/>
-              <a:t>Current</a:t>
+              <a:rPr lang="fr-CH" dirty="0" err="1" smtClean="0"/>
+              <a:t>Results</a:t>
             </a:r>
             <a:r>
-              <a:rPr lang="fr-CH" dirty="0"/>
-              <a:t> state</a:t>
+              <a:rPr lang="fr-CH" dirty="0" smtClean="0"/>
+              <a:t> – Affine</a:t>
             </a:r>
+            <a:endParaRPr lang="fr-CH" dirty="0"/>
+          </a:p>
+        </p:txBody>
+      </p:sp>
+      <p:pic>
+        <p:nvPicPr>
+          <p:cNvPr id="5" name="Image 4"/>
+          <p:cNvPicPr>
+            <a:picLocks noChangeAspect="1"/>
+          </p:cNvPicPr>
+          <p:nvPr/>
+        </p:nvPicPr>
+        <p:blipFill>
+          <a:blip r:embed="rId2">
+            <a:extLst>
+              <a:ext uri="{28A0092B-C50C-407E-A947-70E740481C1C}">
+                <a14:useLocalDpi xmlns:a14="http://schemas.microsoft.com/office/drawing/2010/main" val="0"/>
+              </a:ext>
+            </a:extLst>
+          </a:blip>
+          <a:stretch>
+            <a:fillRect/>
+          </a:stretch>
+        </p:blipFill>
+        <p:spPr>
+          <a:xfrm>
+            <a:off x="672350" y="1009150"/>
+            <a:ext cx="6440174" cy="4025108"/>
+          </a:xfrm>
+          <a:prstGeom prst="rect">
+            <a:avLst/>
+          </a:prstGeom>
+        </p:spPr>
+      </p:pic>
+      <p:sp>
+        <p:nvSpPr>
+          <p:cNvPr id="4" name="ZoneTexte 3"/>
+          <p:cNvSpPr txBox="1"/>
+          <p:nvPr/>
+        </p:nvSpPr>
+        <p:spPr>
+          <a:xfrm>
+            <a:off x="6748798" y="3808428"/>
+            <a:ext cx="1524776" cy="707886"/>
+          </a:xfrm>
+          <a:prstGeom prst="rect">
+            <a:avLst/>
+          </a:prstGeom>
+          <a:noFill/>
+        </p:spPr>
+        <p:txBody>
+          <a:bodyPr wrap="none" rtlCol="0">
+            <a:spAutoFit/>
+          </a:bodyPr>
+          <a:lstStyle/>
+          <a:p>
+            <a:r>
+              <a:rPr lang="fr-CH" sz="800" dirty="0" smtClean="0"/>
+              <a:t>MV: </a:t>
+            </a:r>
+            <a:r>
+              <a:rPr lang="fr-CH" sz="800" dirty="0" err="1" smtClean="0"/>
+              <a:t>majority</a:t>
+            </a:r>
+            <a:r>
+              <a:rPr lang="fr-CH" sz="800" dirty="0" smtClean="0"/>
+              <a:t> </a:t>
+            </a:r>
+            <a:r>
+              <a:rPr lang="fr-CH" sz="800" dirty="0" err="1" smtClean="0"/>
+              <a:t>voting</a:t>
+            </a:r>
+            <a:endParaRPr lang="fr-CH" sz="800" dirty="0" smtClean="0"/>
+          </a:p>
+          <a:p>
+            <a:r>
+              <a:rPr lang="fr-CH" sz="800" dirty="0" smtClean="0"/>
+              <a:t>GW: global </a:t>
+            </a:r>
+            <a:r>
+              <a:rPr lang="fr-CH" sz="800" dirty="0" err="1" smtClean="0"/>
+              <a:t>weights</a:t>
+            </a:r>
+            <a:endParaRPr lang="fr-CH" sz="800" dirty="0" smtClean="0"/>
+          </a:p>
+          <a:p>
+            <a:r>
+              <a:rPr lang="fr-CH" sz="800" dirty="0" smtClean="0"/>
+              <a:t>LW: local </a:t>
+            </a:r>
+            <a:r>
+              <a:rPr lang="fr-CH" sz="800" dirty="0" err="1" smtClean="0"/>
+              <a:t>weights</a:t>
+            </a:r>
+            <a:endParaRPr lang="fr-CH" sz="800" dirty="0" smtClean="0"/>
+          </a:p>
+          <a:p>
+            <a:r>
+              <a:rPr lang="fr-CH" sz="800" dirty="0" smtClean="0"/>
+              <a:t>SBA: </a:t>
+            </a:r>
+            <a:r>
+              <a:rPr lang="fr-CH" sz="800" dirty="0" err="1" smtClean="0"/>
+              <a:t>shape</a:t>
+            </a:r>
+            <a:r>
+              <a:rPr lang="fr-CH" sz="800" dirty="0" smtClean="0"/>
+              <a:t> </a:t>
+            </a:r>
+            <a:r>
+              <a:rPr lang="fr-CH" sz="800" dirty="0" err="1" smtClean="0"/>
+              <a:t>based</a:t>
+            </a:r>
+            <a:r>
+              <a:rPr lang="fr-CH" sz="800" dirty="0" smtClean="0"/>
+              <a:t> </a:t>
+            </a:r>
+            <a:r>
+              <a:rPr lang="fr-CH" sz="800" dirty="0" err="1" smtClean="0"/>
+              <a:t>averaging</a:t>
+            </a:r>
+            <a:endParaRPr lang="fr-CH" sz="800" dirty="0" smtClean="0"/>
+          </a:p>
+          <a:p>
+            <a:r>
+              <a:rPr lang="fr-CH" sz="800" dirty="0" smtClean="0"/>
+              <a:t>ML: machine </a:t>
+            </a:r>
+            <a:r>
+              <a:rPr lang="fr-CH" sz="800" dirty="0" err="1" smtClean="0"/>
+              <a:t>learning</a:t>
+            </a:r>
+            <a:endParaRPr lang="fr-CH" sz="800" dirty="0"/>
           </a:p>
         </p:txBody>
       </p:sp>
     </p:spTree>
     <p:extLst>
       <p:ext uri="{BB962C8B-B14F-4D97-AF65-F5344CB8AC3E}">
-        <p14:creationId xmlns:p14="http://schemas.microsoft.com/office/powerpoint/2010/main" val="2982305108"/>
+        <p14:creationId xmlns:p14="http://schemas.microsoft.com/office/powerpoint/2010/main" val="2038282951"/>
       </p:ext>
     </p:extLst>
   </p:cSld>
@@ -19081,106 +19259,6 @@
       </p:grpSpPr>
       <p:sp>
         <p:nvSpPr>
-          <p:cNvPr id="2" name="Espace réservé du texte 1"/>
-          <p:cNvSpPr>
-            <a:spLocks noGrp="1"/>
-          </p:cNvSpPr>
-          <p:nvPr>
-            <p:ph type="body" idx="1"/>
-          </p:nvPr>
-        </p:nvSpPr>
-        <p:spPr/>
-        <p:txBody>
-          <a:bodyPr/>
-          <a:lstStyle/>
-          <a:p>
-            <a:pPr>
-              <a:spcAft>
-                <a:spcPts val="600"/>
-              </a:spcAft>
-            </a:pPr>
-            <a:r>
-              <a:rPr lang="en-GB" dirty="0"/>
-              <a:t>More </a:t>
-            </a:r>
-            <a:r>
-              <a:rPr lang="en-GB" dirty="0" err="1"/>
-              <a:t>altas</a:t>
-            </a:r>
-            <a:r>
-              <a:rPr lang="en-GB" dirty="0"/>
-              <a:t> building techniques</a:t>
-            </a:r>
-          </a:p>
-          <a:p>
-            <a:pPr>
-              <a:spcAft>
-                <a:spcPts val="600"/>
-              </a:spcAft>
-            </a:pPr>
-            <a:r>
-              <a:rPr lang="en-GB" dirty="0"/>
-              <a:t>More ML segmentation types</a:t>
-            </a:r>
-          </a:p>
-          <a:p>
-            <a:pPr>
-              <a:spcAft>
-                <a:spcPts val="600"/>
-              </a:spcAft>
-            </a:pPr>
-            <a:r>
-              <a:rPr lang="en-GB" dirty="0" err="1"/>
-              <a:t>Uniformize</a:t>
-            </a:r>
-            <a:r>
-              <a:rPr lang="en-GB" dirty="0"/>
-              <a:t> result plot</a:t>
-            </a:r>
-          </a:p>
-          <a:p>
-            <a:pPr>
-              <a:spcAft>
-                <a:spcPts val="600"/>
-              </a:spcAft>
-            </a:pPr>
-            <a:r>
-              <a:rPr lang="en-GB" dirty="0"/>
-              <a:t>Eventually hybrid solution</a:t>
-            </a:r>
-          </a:p>
-          <a:p>
-            <a:pPr lvl="1">
-              <a:spcBef>
-                <a:spcPts val="0"/>
-              </a:spcBef>
-              <a:spcAft>
-                <a:spcPts val="600"/>
-              </a:spcAft>
-            </a:pPr>
-            <a:r>
-              <a:rPr lang="en-GB" dirty="0"/>
-              <a:t>ML for grey and white matter</a:t>
-            </a:r>
-          </a:p>
-          <a:p>
-            <a:pPr lvl="1">
-              <a:spcBef>
-                <a:spcPts val="0"/>
-              </a:spcBef>
-              <a:spcAft>
-                <a:spcPts val="600"/>
-              </a:spcAft>
-            </a:pPr>
-            <a:r>
-              <a:rPr lang="en-GB" dirty="0"/>
-              <a:t>Atlas for amygdala, hippocampus and thalamus</a:t>
-            </a:r>
-          </a:p>
-        </p:txBody>
-      </p:sp>
-      <p:sp>
-        <p:nvSpPr>
           <p:cNvPr id="3" name="Titre 2"/>
           <p:cNvSpPr>
             <a:spLocks noGrp="1"/>
@@ -19195,16 +19273,157 @@
           <a:lstStyle/>
           <a:p>
             <a:r>
-              <a:rPr lang="fr-CH" dirty="0"/>
-              <a:t>Outlook</a:t>
+              <a:rPr lang="fr-CH" dirty="0" err="1" smtClean="0"/>
+              <a:t>Results</a:t>
             </a:r>
+            <a:r>
+              <a:rPr lang="fr-CH" dirty="0" smtClean="0"/>
+              <a:t> – Non-</a:t>
+            </a:r>
+            <a:r>
+              <a:rPr lang="fr-CH" dirty="0" err="1" smtClean="0"/>
+              <a:t>rigid</a:t>
+            </a:r>
+            <a:endParaRPr lang="fr-CH" dirty="0"/>
+          </a:p>
+        </p:txBody>
+      </p:sp>
+      <p:pic>
+        <p:nvPicPr>
+          <p:cNvPr id="5" name="Image 4"/>
+          <p:cNvPicPr>
+            <a:picLocks noChangeAspect="1"/>
+          </p:cNvPicPr>
+          <p:nvPr/>
+        </p:nvPicPr>
+        <p:blipFill>
+          <a:blip r:embed="rId2">
+            <a:extLst>
+              <a:ext uri="{28A0092B-C50C-407E-A947-70E740481C1C}">
+                <a14:useLocalDpi xmlns:a14="http://schemas.microsoft.com/office/drawing/2010/main" val="0"/>
+              </a:ext>
+            </a:extLst>
+          </a:blip>
+          <a:stretch>
+            <a:fillRect/>
+          </a:stretch>
+        </p:blipFill>
+        <p:spPr>
+          <a:xfrm>
+            <a:off x="672350" y="1009150"/>
+            <a:ext cx="6440174" cy="4025108"/>
+          </a:xfrm>
+          <a:prstGeom prst="rect">
+            <a:avLst/>
+          </a:prstGeom>
+        </p:spPr>
+      </p:pic>
+      <p:sp>
+        <p:nvSpPr>
+          <p:cNvPr id="4" name="ZoneTexte 3"/>
+          <p:cNvSpPr txBox="1"/>
+          <p:nvPr/>
+        </p:nvSpPr>
+        <p:spPr>
+          <a:xfrm>
+            <a:off x="6748798" y="3808428"/>
+            <a:ext cx="1524776" cy="707886"/>
+          </a:xfrm>
+          <a:prstGeom prst="rect">
+            <a:avLst/>
+          </a:prstGeom>
+          <a:noFill/>
+        </p:spPr>
+        <p:txBody>
+          <a:bodyPr wrap="none" rtlCol="0">
+            <a:spAutoFit/>
+          </a:bodyPr>
+          <a:lstStyle/>
+          <a:p>
+            <a:r>
+              <a:rPr lang="fr-CH" sz="800" dirty="0" smtClean="0"/>
+              <a:t>MV: </a:t>
+            </a:r>
+            <a:r>
+              <a:rPr lang="fr-CH" sz="800" dirty="0" err="1" smtClean="0"/>
+              <a:t>majority</a:t>
+            </a:r>
+            <a:r>
+              <a:rPr lang="fr-CH" sz="800" dirty="0" smtClean="0"/>
+              <a:t> </a:t>
+            </a:r>
+            <a:r>
+              <a:rPr lang="fr-CH" sz="800" dirty="0" err="1" smtClean="0"/>
+              <a:t>voting</a:t>
+            </a:r>
+            <a:endParaRPr lang="fr-CH" sz="800" dirty="0" smtClean="0"/>
+          </a:p>
+          <a:p>
+            <a:r>
+              <a:rPr lang="fr-CH" sz="800" dirty="0" smtClean="0"/>
+              <a:t>GW: global </a:t>
+            </a:r>
+            <a:r>
+              <a:rPr lang="fr-CH" sz="800" dirty="0" err="1" smtClean="0"/>
+              <a:t>weights</a:t>
+            </a:r>
+            <a:endParaRPr lang="fr-CH" sz="800" dirty="0" smtClean="0"/>
+          </a:p>
+          <a:p>
+            <a:r>
+              <a:rPr lang="fr-CH" sz="800" dirty="0" smtClean="0"/>
+              <a:t>LW: local </a:t>
+            </a:r>
+            <a:r>
+              <a:rPr lang="fr-CH" sz="800" dirty="0" err="1" smtClean="0"/>
+              <a:t>weights</a:t>
+            </a:r>
+            <a:endParaRPr lang="fr-CH" sz="800" dirty="0" smtClean="0"/>
+          </a:p>
+          <a:p>
+            <a:r>
+              <a:rPr lang="fr-CH" sz="800" dirty="0" smtClean="0"/>
+              <a:t>SBA: </a:t>
+            </a:r>
+            <a:r>
+              <a:rPr lang="fr-CH" sz="800" dirty="0" err="1" smtClean="0"/>
+              <a:t>shape</a:t>
+            </a:r>
+            <a:r>
+              <a:rPr lang="fr-CH" sz="800" dirty="0" smtClean="0"/>
+              <a:t> </a:t>
+            </a:r>
+            <a:r>
+              <a:rPr lang="fr-CH" sz="800" dirty="0" err="1" smtClean="0"/>
+              <a:t>based</a:t>
+            </a:r>
+            <a:r>
+              <a:rPr lang="fr-CH" sz="800" dirty="0" smtClean="0"/>
+              <a:t> </a:t>
+            </a:r>
+            <a:r>
+              <a:rPr lang="fr-CH" sz="800" dirty="0" err="1" smtClean="0"/>
+              <a:t>averaging</a:t>
+            </a:r>
+            <a:endParaRPr lang="fr-CH" sz="800" dirty="0" smtClean="0"/>
+          </a:p>
+          <a:p>
+            <a:r>
+              <a:rPr lang="fr-CH" sz="800" dirty="0" smtClean="0"/>
+              <a:t>ML: machine </a:t>
+            </a:r>
+            <a:r>
+              <a:rPr lang="fr-CH" sz="800" dirty="0" err="1" smtClean="0"/>
+              <a:t>learning</a:t>
+            </a:r>
+            <a:endParaRPr lang="fr-CH" sz="800" dirty="0"/>
           </a:p>
         </p:txBody>
       </p:sp>
     </p:spTree>
     <p:extLst>
       <p:ext uri="{BB962C8B-B14F-4D97-AF65-F5344CB8AC3E}">
-        <p14:creationId xmlns:p14="http://schemas.microsoft.com/office/powerpoint/2010/main" val="3395289792"/>
+        <p14:creationId xmlns:p14="http://schemas.microsoft.com/office/powerpoint/2010/main" val="748784096"/>
       </p:ext>
     </p:extLst>
   </p:cSld>

</xml_diff>

<commit_message>
added conclusion to report
</commit_message>
<xml_diff>
--- a/presentation/Presentation.pptx
+++ b/presentation/Presentation.pptx
@@ -5,7 +5,7 @@
     <p:sldMasterId id="2147483672" r:id="rId1"/>
   </p:sldMasterIdLst>
   <p:notesMasterIdLst>
-    <p:notesMasterId r:id="rId13"/>
+    <p:notesMasterId r:id="rId14"/>
   </p:notesMasterIdLst>
   <p:sldIdLst>
     <p:sldId id="256" r:id="rId2"/>
@@ -17,23 +17,24 @@
     <p:sldId id="316" r:id="rId8"/>
     <p:sldId id="319" r:id="rId9"/>
     <p:sldId id="320" r:id="rId10"/>
-    <p:sldId id="310" r:id="rId11"/>
-    <p:sldId id="311" r:id="rId12"/>
+    <p:sldId id="321" r:id="rId11"/>
+    <p:sldId id="310" r:id="rId12"/>
+    <p:sldId id="311" r:id="rId13"/>
   </p:sldIdLst>
   <p:sldSz cx="9144000" cy="5143500" type="screen16x9"/>
   <p:notesSz cx="6858000" cy="9144000"/>
   <p:embeddedFontLst>
     <p:embeddedFont>
       <p:font typeface="Fira Sans Condensed ExtraBold" panose="020B0604020202020204" charset="0"/>
-      <p:bold r:id="rId14"/>
-      <p:boldItalic r:id="rId15"/>
+      <p:bold r:id="rId15"/>
+      <p:boldItalic r:id="rId16"/>
     </p:embeddedFont>
     <p:embeddedFont>
       <p:font typeface="Fira Sans Condensed" panose="020B0604020202020204" charset="0"/>
-      <p:regular r:id="rId16"/>
-      <p:bold r:id="rId17"/>
-      <p:italic r:id="rId18"/>
-      <p:boldItalic r:id="rId19"/>
+      <p:regular r:id="rId17"/>
+      <p:bold r:id="rId18"/>
+      <p:italic r:id="rId19"/>
+      <p:boldItalic r:id="rId20"/>
     </p:embeddedFont>
   </p:embeddedFontLst>
   <p:defaultTextStyle>
@@ -17805,6 +17806,121 @@
             <p:ph type="body" idx="1"/>
           </p:nvPr>
         </p:nvSpPr>
+        <p:spPr>
+          <a:xfrm>
+            <a:off x="672350" y="1554675"/>
+            <a:ext cx="6025394" cy="2838000"/>
+          </a:xfrm>
+        </p:spPr>
+        <p:txBody>
+          <a:bodyPr/>
+          <a:lstStyle/>
+          <a:p>
+            <a:pPr>
+              <a:spcAft>
+                <a:spcPts val="600"/>
+              </a:spcAft>
+            </a:pPr>
+            <a:r>
+              <a:rPr lang="en-GB" dirty="0" smtClean="0"/>
+              <a:t>Minor difference between non-rigid and affine registration</a:t>
+            </a:r>
+          </a:p>
+          <a:p>
+            <a:pPr>
+              <a:spcAft>
+                <a:spcPts val="600"/>
+              </a:spcAft>
+            </a:pPr>
+            <a:r>
+              <a:rPr lang="en-GB" dirty="0" smtClean="0"/>
+              <a:t>Machine learning struggles with small brain parts</a:t>
+            </a:r>
+          </a:p>
+          <a:p>
+            <a:pPr>
+              <a:spcAft>
+                <a:spcPts val="600"/>
+              </a:spcAft>
+            </a:pPr>
+            <a:r>
+              <a:rPr lang="en-GB" dirty="0" smtClean="0"/>
+              <a:t>Atlas-based segmentation with local weights works best</a:t>
+            </a:r>
+            <a:endParaRPr lang="en-GB" dirty="0"/>
+          </a:p>
+        </p:txBody>
+      </p:sp>
+      <p:sp>
+        <p:nvSpPr>
+          <p:cNvPr id="3" name="Titre 2"/>
+          <p:cNvSpPr>
+            <a:spLocks noGrp="1"/>
+          </p:cNvSpPr>
+          <p:nvPr>
+            <p:ph type="title"/>
+          </p:nvPr>
+        </p:nvSpPr>
+        <p:spPr/>
+        <p:txBody>
+          <a:bodyPr/>
+          <a:lstStyle/>
+          <a:p>
+            <a:r>
+              <a:rPr lang="fr-CH" dirty="0" smtClean="0"/>
+              <a:t>Conclusion</a:t>
+            </a:r>
+            <a:endParaRPr lang="fr-CH" dirty="0"/>
+          </a:p>
+        </p:txBody>
+      </p:sp>
+    </p:spTree>
+    <p:extLst>
+      <p:ext uri="{BB962C8B-B14F-4D97-AF65-F5344CB8AC3E}">
+        <p14:creationId xmlns:p14="http://schemas.microsoft.com/office/powerpoint/2010/main" val="2248065924"/>
+      </p:ext>
+    </p:extLst>
+  </p:cSld>
+  <p:clrMapOvr>
+    <a:masterClrMapping/>
+  </p:clrMapOvr>
+  <p:timing>
+    <p:tnLst>
+      <p:par>
+        <p:cTn id="1" dur="indefinite" restart="never" nodeType="tmRoot"/>
+      </p:par>
+    </p:tnLst>
+  </p:timing>
+</p:sld>
+</file>
+
+<file path=ppt/slides/slide11.xml><?xml version="1.0" encoding="utf-8"?>
+<p:sld xmlns:a="http://schemas.openxmlformats.org/drawingml/2006/main" xmlns:r="http://schemas.openxmlformats.org/officeDocument/2006/relationships" xmlns:p="http://schemas.openxmlformats.org/presentationml/2006/main">
+  <p:cSld>
+    <p:spTree>
+      <p:nvGrpSpPr>
+        <p:cNvPr id="1" name=""/>
+        <p:cNvGrpSpPr/>
+        <p:nvPr/>
+      </p:nvGrpSpPr>
+      <p:grpSpPr>
+        <a:xfrm>
+          <a:off x="0" y="0"/>
+          <a:ext cx="0" cy="0"/>
+          <a:chOff x="0" y="0"/>
+          <a:chExt cx="0" cy="0"/>
+        </a:xfrm>
+      </p:grpSpPr>
+      <p:sp>
+        <p:nvSpPr>
+          <p:cNvPr id="2" name="Espace réservé du texte 1"/>
+          <p:cNvSpPr>
+            <a:spLocks noGrp="1"/>
+          </p:cNvSpPr>
+          <p:nvPr>
+            <p:ph type="body" idx="1"/>
+          </p:nvPr>
+        </p:nvSpPr>
         <p:spPr/>
         <p:txBody>
           <a:bodyPr/>
@@ -17880,7 +17996,7 @@
 </p:sld>
 </file>
 
-<file path=ppt/slides/slide11.xml><?xml version="1.0" encoding="utf-8"?>
+<file path=ppt/slides/slide12.xml><?xml version="1.0" encoding="utf-8"?>
 <p:sld xmlns:a="http://schemas.openxmlformats.org/drawingml/2006/main" xmlns:r="http://schemas.openxmlformats.org/officeDocument/2006/relationships" xmlns:p="http://schemas.openxmlformats.org/presentationml/2006/main">
   <p:cSld>
     <p:spTree>
@@ -18040,13 +18156,21 @@
               </a:spcAft>
             </a:pPr>
             <a:r>
-              <a:rPr lang="en-US" dirty="0"/>
-              <a:t>R</a:t>
+              <a:rPr lang="en-US" dirty="0" smtClean="0"/>
+              <a:t>Results</a:t>
             </a:r>
+          </a:p>
+          <a:p>
+            <a:pPr>
+              <a:spcAft>
+                <a:spcPts val="600"/>
+              </a:spcAft>
+            </a:pPr>
             <a:r>
               <a:rPr lang="en-US" dirty="0" smtClean="0"/>
-              <a:t>esults</a:t>
+              <a:t>Conclusion</a:t>
             </a:r>
+            <a:endParaRPr lang="en-US" dirty="0" smtClean="0"/>
           </a:p>
           <a:p>
             <a:pPr>
@@ -18672,7 +18796,7 @@
           <p:cNvPr id="12" name="Textfeld 11">
             <a:extLst>
               <a:ext uri="{FF2B5EF4-FFF2-40B4-BE49-F238E27FC236}">
-                <a16:creationId xmlns="" xmlns:a16="http://schemas.microsoft.com/office/drawing/2014/main" id="{6FBAE4E7-3A3E-415A-8FC6-165BDB05ADF1}"/>
+                <a16:creationId xmlns:a16="http://schemas.microsoft.com/office/drawing/2014/main" xmlns="" id="{6FBAE4E7-3A3E-415A-8FC6-165BDB05ADF1}"/>
               </a:ext>
             </a:extLst>
           </p:cNvPr>
@@ -18743,7 +18867,7 @@
           <p:cNvPr id="14" name="Textfeld 13">
             <a:extLst>
               <a:ext uri="{FF2B5EF4-FFF2-40B4-BE49-F238E27FC236}">
-                <a16:creationId xmlns="" xmlns:a16="http://schemas.microsoft.com/office/drawing/2014/main" id="{672DD57D-91A9-4F21-9981-CDDB90B625C7}"/>
+                <a16:creationId xmlns:a16="http://schemas.microsoft.com/office/drawing/2014/main" xmlns="" id="{672DD57D-91A9-4F21-9981-CDDB90B625C7}"/>
               </a:ext>
             </a:extLst>
           </p:cNvPr>
@@ -18791,7 +18915,7 @@
           <p:cNvPr id="4" name="Grafik 3">
             <a:extLst>
               <a:ext uri="{FF2B5EF4-FFF2-40B4-BE49-F238E27FC236}">
-                <a16:creationId xmlns="" xmlns:a16="http://schemas.microsoft.com/office/drawing/2014/main" id="{7E3AF0D3-7CCB-49C7-8201-E4D490CA2181}"/>
+                <a16:creationId xmlns:a16="http://schemas.microsoft.com/office/drawing/2014/main" xmlns="" id="{7E3AF0D3-7CCB-49C7-8201-E4D490CA2181}"/>
               </a:ext>
             </a:extLst>
           </p:cNvPr>
@@ -18820,7 +18944,7 @@
           <p:cNvPr id="6" name="Grafik 5">
             <a:extLst>
               <a:ext uri="{FF2B5EF4-FFF2-40B4-BE49-F238E27FC236}">
-                <a16:creationId xmlns="" xmlns:a16="http://schemas.microsoft.com/office/drawing/2014/main" id="{ADE48117-B4F3-4EC6-BD89-D1CD35CC7B8F}"/>
+                <a16:creationId xmlns:a16="http://schemas.microsoft.com/office/drawing/2014/main" xmlns="" id="{ADE48117-B4F3-4EC6-BD89-D1CD35CC7B8F}"/>
               </a:ext>
             </a:extLst>
           </p:cNvPr>
@@ -19082,7 +19206,11 @@
             </a:r>
             <a:r>
               <a:rPr lang="fr-CH" dirty="0" smtClean="0"/>
-              <a:t> – Affine</a:t>
+              <a:t> – </a:t>
+            </a:r>
+            <a:r>
+              <a:rPr lang="fr-CH" dirty="0" smtClean="0"/>
+              <a:t>Affine registration</a:t>
             </a:r>
             <a:endParaRPr lang="fr-CH" dirty="0"/>
           </a:p>
@@ -19267,7 +19395,12 @@
             <p:ph type="title"/>
           </p:nvPr>
         </p:nvSpPr>
-        <p:spPr/>
+        <p:spPr>
+          <a:xfrm>
+            <a:off x="672349" y="436450"/>
+            <a:ext cx="5719023" cy="572700"/>
+          </a:xfrm>
+        </p:spPr>
         <p:txBody>
           <a:bodyPr/>
           <a:lstStyle/>
@@ -19278,11 +19411,23 @@
             </a:r>
             <a:r>
               <a:rPr lang="fr-CH" dirty="0" smtClean="0"/>
-              <a:t> – Non-</a:t>
+              <a:t> – </a:t>
+            </a:r>
+            <a:r>
+              <a:rPr lang="fr-CH" dirty="0" smtClean="0"/>
+              <a:t>Non-</a:t>
             </a:r>
             <a:r>
               <a:rPr lang="fr-CH" dirty="0" err="1" smtClean="0"/>
               <a:t>rigid</a:t>
+            </a:r>
+            <a:r>
+              <a:rPr lang="fr-CH" dirty="0" smtClean="0"/>
+              <a:t> </a:t>
+            </a:r>
+            <a:r>
+              <a:rPr lang="fr-CH" dirty="0" smtClean="0"/>
+              <a:t>registration</a:t>
             </a:r>
             <a:endParaRPr lang="fr-CH" dirty="0"/>
           </a:p>

</xml_diff>

<commit_message>
minor improvements for final presentation
</commit_message>
<xml_diff>
--- a/presentation/Presentation.pptx
+++ b/presentation/Presentation.pptx
@@ -17874,6 +17874,36 @@
           </a:p>
         </p:txBody>
       </p:sp>
+      <p:pic>
+        <p:nvPicPr>
+          <p:cNvPr id="4" name="Image 3"/>
+          <p:cNvPicPr>
+            <a:picLocks noChangeAspect="1"/>
+          </p:cNvPicPr>
+          <p:nvPr/>
+        </p:nvPicPr>
+        <p:blipFill>
+          <a:blip r:embed="rId2">
+            <a:extLst>
+              <a:ext uri="{28A0092B-C50C-407E-A947-70E740481C1C}">
+                <a14:useLocalDpi xmlns:a14="http://schemas.microsoft.com/office/drawing/2010/main" val="0"/>
+              </a:ext>
+            </a:extLst>
+          </a:blip>
+          <a:stretch>
+            <a:fillRect/>
+          </a:stretch>
+        </p:blipFill>
+        <p:spPr>
+          <a:xfrm>
+            <a:off x="672350" y="2611225"/>
+            <a:ext cx="3376366" cy="2532275"/>
+          </a:xfrm>
+          <a:prstGeom prst="rect">
+            <a:avLst/>
+          </a:prstGeom>
+        </p:spPr>
+      </p:pic>
     </p:spTree>
     <p:extLst>
       <p:ext uri="{BB962C8B-B14F-4D97-AF65-F5344CB8AC3E}">
@@ -17921,7 +17951,12 @@
             <p:ph type="body" idx="1"/>
           </p:nvPr>
         </p:nvSpPr>
-        <p:spPr/>
+        <p:spPr>
+          <a:xfrm>
+            <a:off x="672350" y="1554675"/>
+            <a:ext cx="6133803" cy="2838000"/>
+          </a:xfrm>
+        </p:spPr>
         <p:txBody>
           <a:bodyPr/>
           <a:lstStyle/>
@@ -17950,7 +17985,56 @@
               <a:rPr lang="en-GB" dirty="0" smtClean="0"/>
               <a:t>code</a:t>
             </a:r>
-            <a:endParaRPr lang="en-GB" dirty="0"/>
+          </a:p>
+          <a:p>
+            <a:pPr>
+              <a:spcAft>
+                <a:spcPts val="600"/>
+              </a:spcAft>
+            </a:pPr>
+            <a:r>
+              <a:rPr lang="en-GB" dirty="0" smtClean="0"/>
+              <a:t>Hybrid solution:</a:t>
+            </a:r>
+          </a:p>
+          <a:p>
+            <a:pPr lvl="1">
+              <a:spcBef>
+                <a:spcPts val="0"/>
+              </a:spcBef>
+              <a:spcAft>
+                <a:spcPts val="600"/>
+              </a:spcAft>
+            </a:pPr>
+            <a:r>
+              <a:rPr lang="en-GB" dirty="0" smtClean="0"/>
+              <a:t>Machine learning for grey and white matter</a:t>
+            </a:r>
+          </a:p>
+          <a:p>
+            <a:pPr lvl="1">
+              <a:spcBef>
+                <a:spcPts val="0"/>
+              </a:spcBef>
+              <a:spcAft>
+                <a:spcPts val="600"/>
+              </a:spcAft>
+            </a:pPr>
+            <a:r>
+              <a:rPr lang="en-GB" dirty="0" smtClean="0"/>
+              <a:t>Atlas-based for amygdala, hippocampus and thalamus</a:t>
+            </a:r>
+          </a:p>
+          <a:p>
+            <a:pPr>
+              <a:spcAft>
+                <a:spcPts val="600"/>
+              </a:spcAft>
+            </a:pPr>
+            <a:r>
+              <a:rPr lang="en-GB" dirty="0" smtClean="0"/>
+              <a:t>Further machine learning algorithms</a:t>
+            </a:r>
           </a:p>
         </p:txBody>
       </p:sp>
@@ -18170,7 +18254,6 @@
               <a:rPr lang="en-US" dirty="0" smtClean="0"/>
               <a:t>Conclusion</a:t>
             </a:r>
-            <a:endParaRPr lang="en-US" dirty="0" smtClean="0"/>
           </a:p>
           <a:p>
             <a:pPr>
@@ -18796,7 +18879,7 @@
           <p:cNvPr id="12" name="Textfeld 11">
             <a:extLst>
               <a:ext uri="{FF2B5EF4-FFF2-40B4-BE49-F238E27FC236}">
-                <a16:creationId xmlns:a16="http://schemas.microsoft.com/office/drawing/2014/main" xmlns="" id="{6FBAE4E7-3A3E-415A-8FC6-165BDB05ADF1}"/>
+                <a16:creationId xmlns="" xmlns:a16="http://schemas.microsoft.com/office/drawing/2014/main" id="{6FBAE4E7-3A3E-415A-8FC6-165BDB05ADF1}"/>
               </a:ext>
             </a:extLst>
           </p:cNvPr>
@@ -18867,7 +18950,7 @@
           <p:cNvPr id="14" name="Textfeld 13">
             <a:extLst>
               <a:ext uri="{FF2B5EF4-FFF2-40B4-BE49-F238E27FC236}">
-                <a16:creationId xmlns:a16="http://schemas.microsoft.com/office/drawing/2014/main" xmlns="" id="{672DD57D-91A9-4F21-9981-CDDB90B625C7}"/>
+                <a16:creationId xmlns="" xmlns:a16="http://schemas.microsoft.com/office/drawing/2014/main" id="{672DD57D-91A9-4F21-9981-CDDB90B625C7}"/>
               </a:ext>
             </a:extLst>
           </p:cNvPr>
@@ -18915,7 +18998,7 @@
           <p:cNvPr id="4" name="Grafik 3">
             <a:extLst>
               <a:ext uri="{FF2B5EF4-FFF2-40B4-BE49-F238E27FC236}">
-                <a16:creationId xmlns:a16="http://schemas.microsoft.com/office/drawing/2014/main" xmlns="" id="{7E3AF0D3-7CCB-49C7-8201-E4D490CA2181}"/>
+                <a16:creationId xmlns="" xmlns:a16="http://schemas.microsoft.com/office/drawing/2014/main" id="{7E3AF0D3-7CCB-49C7-8201-E4D490CA2181}"/>
               </a:ext>
             </a:extLst>
           </p:cNvPr>
@@ -18944,7 +19027,7 @@
           <p:cNvPr id="6" name="Grafik 5">
             <a:extLst>
               <a:ext uri="{FF2B5EF4-FFF2-40B4-BE49-F238E27FC236}">
-                <a16:creationId xmlns:a16="http://schemas.microsoft.com/office/drawing/2014/main" xmlns="" id="{ADE48117-B4F3-4EC6-BD89-D1CD35CC7B8F}"/>
+                <a16:creationId xmlns="" xmlns:a16="http://schemas.microsoft.com/office/drawing/2014/main" id="{ADE48117-B4F3-4EC6-BD89-D1CD35CC7B8F}"/>
               </a:ext>
             </a:extLst>
           </p:cNvPr>
@@ -19206,11 +19289,7 @@
             </a:r>
             <a:r>
               <a:rPr lang="fr-CH" dirty="0" smtClean="0"/>
-              <a:t> – </a:t>
-            </a:r>
-            <a:r>
-              <a:rPr lang="fr-CH" dirty="0" smtClean="0"/>
-              <a:t>Affine registration</a:t>
+              <a:t> – Affine registration</a:t>
             </a:r>
             <a:endParaRPr lang="fr-CH" dirty="0"/>
           </a:p>
@@ -19411,11 +19490,7 @@
             </a:r>
             <a:r>
               <a:rPr lang="fr-CH" dirty="0" smtClean="0"/>
-              <a:t> – </a:t>
-            </a:r>
-            <a:r>
-              <a:rPr lang="fr-CH" dirty="0" smtClean="0"/>
-              <a:t>Non-</a:t>
+              <a:t> – Non-</a:t>
             </a:r>
             <a:r>
               <a:rPr lang="fr-CH" dirty="0" err="1" smtClean="0"/>
@@ -19423,11 +19498,7 @@
             </a:r>
             <a:r>
               <a:rPr lang="fr-CH" dirty="0" smtClean="0"/>
-              <a:t> </a:t>
-            </a:r>
-            <a:r>
-              <a:rPr lang="fr-CH" dirty="0" smtClean="0"/>
-              <a:t>registration</a:t>
+              <a:t> registration</a:t>
             </a:r>
             <a:endParaRPr lang="fr-CH" dirty="0"/>
           </a:p>

</xml_diff>